<commit_message>
updated ppt to include RTM
</commit_message>
<xml_diff>
--- a/PrimerNotes.pptx
+++ b/PrimerNotes.pptx
@@ -13,6 +13,8 @@
     <p:sldId id="261" r:id="rId7"/>
     <p:sldId id="262" r:id="rId8"/>
     <p:sldId id="263" r:id="rId9"/>
+    <p:sldId id="264" r:id="rId10"/>
+    <p:sldId id="265" r:id="rId11"/>
   </p:sldIdLst>
   <p:sldSz cx="12192000" cy="6858000"/>
   <p:notesSz cx="6858000" cy="9144000"/>
@@ -111,6 +113,11 @@
       </a:defRPr>
     </a:lvl9pPr>
   </p:defaultTextStyle>
+  <p:extLst>
+    <p:ext uri="{EFAFB233-063F-42B5-8137-9DF3F51BA10A}">
+      <p15:sldGuideLst xmlns:p15="http://schemas.microsoft.com/office/powerpoint/2012/main"/>
+    </p:ext>
+  </p:extLst>
 </p:presentation>
 </file>
 
@@ -3394,6 +3401,110 @@
 </p:sld>
 </file>
 
+<file path=ppt/slides/slide10.xml><?xml version="1.0" encoding="utf-8"?>
+<p:sld xmlns:a="http://schemas.openxmlformats.org/drawingml/2006/main" xmlns:r="http://schemas.openxmlformats.org/officeDocument/2006/relationships" xmlns:p="http://schemas.openxmlformats.org/presentationml/2006/main">
+  <p:cSld>
+    <p:spTree>
+      <p:nvGrpSpPr>
+        <p:cNvPr id="1" name=""/>
+        <p:cNvGrpSpPr/>
+        <p:nvPr/>
+      </p:nvGrpSpPr>
+      <p:grpSpPr>
+        <a:xfrm>
+          <a:off x="0" y="0"/>
+          <a:ext cx="0" cy="0"/>
+          <a:chOff x="0" y="0"/>
+          <a:chExt cx="0" cy="0"/>
+        </a:xfrm>
+      </p:grpSpPr>
+      <p:sp>
+        <p:nvSpPr>
+          <p:cNvPr id="2" name="Title 1">
+            <a:extLst>
+              <a:ext uri="{FF2B5EF4-FFF2-40B4-BE49-F238E27FC236}">
+                <a16:creationId xmlns:a16="http://schemas.microsoft.com/office/drawing/2014/main" id="{463C205E-B8F0-4C3B-B1DF-11A6EBF4A7F8}"/>
+              </a:ext>
+            </a:extLst>
+          </p:cNvPr>
+          <p:cNvSpPr>
+            <a:spLocks noGrp="1"/>
+          </p:cNvSpPr>
+          <p:nvPr>
+            <p:ph type="title"/>
+          </p:nvPr>
+        </p:nvSpPr>
+        <p:spPr/>
+        <p:txBody>
+          <a:bodyPr/>
+          <a:lstStyle/>
+          <a:p>
+            <a:r>
+              <a:rPr lang="en-US" dirty="0"/>
+              <a:t>RTM</a:t>
+            </a:r>
+          </a:p>
+        </p:txBody>
+      </p:sp>
+      <p:sp>
+        <p:nvSpPr>
+          <p:cNvPr id="3" name="Content Placeholder 2">
+            <a:extLst>
+              <a:ext uri="{FF2B5EF4-FFF2-40B4-BE49-F238E27FC236}">
+                <a16:creationId xmlns:a16="http://schemas.microsoft.com/office/drawing/2014/main" id="{075B7B49-73F7-4B7F-A38C-8AED11808EB8}"/>
+              </a:ext>
+            </a:extLst>
+          </p:cNvPr>
+          <p:cNvSpPr>
+            <a:spLocks noGrp="1"/>
+          </p:cNvSpPr>
+          <p:nvPr>
+            <p:ph idx="1"/>
+          </p:nvPr>
+        </p:nvSpPr>
+        <p:spPr/>
+        <p:txBody>
+          <a:bodyPr/>
+          <a:lstStyle/>
+          <a:p>
+            <a:r>
+              <a:rPr lang="en-US" dirty="0"/>
+              <a:t>Requirements Traceability Matrix outlines all test cases and compares them to the desired requirements</a:t>
+            </a:r>
+          </a:p>
+          <a:p>
+            <a:r>
+              <a:rPr lang="en-US" dirty="0"/>
+              <a:t>It marks if they have passed or failed their test</a:t>
+            </a:r>
+          </a:p>
+          <a:p>
+            <a:r>
+              <a:rPr lang="en-US" dirty="0"/>
+              <a:t>Single location where you can show that you succeeded at your job as tester</a:t>
+            </a:r>
+          </a:p>
+          <a:p>
+            <a:r>
+              <a:rPr lang="en-US" dirty="0"/>
+              <a:t>https://www.guru99.com/traceability-matrix.html</a:t>
+            </a:r>
+          </a:p>
+        </p:txBody>
+      </p:sp>
+    </p:spTree>
+    <p:extLst>
+      <p:ext uri="{BB962C8B-B14F-4D97-AF65-F5344CB8AC3E}">
+        <p14:creationId xmlns:p14="http://schemas.microsoft.com/office/powerpoint/2010/main" val="1856527610"/>
+      </p:ext>
+    </p:extLst>
+  </p:cSld>
+  <p:clrMapOvr>
+    <a:masterClrMapping/>
+  </p:clrMapOvr>
+</p:sld>
+</file>
+
 <file path=ppt/slides/slide2.xml><?xml version="1.0" encoding="utf-8"?>
 <p:sld xmlns:a="http://schemas.openxmlformats.org/drawingml/2006/main" xmlns:r="http://schemas.openxmlformats.org/officeDocument/2006/relationships" xmlns:p="http://schemas.openxmlformats.org/presentationml/2006/main">
   <p:cSld>
@@ -4341,6 +4452,110 @@
     <p:extLst>
       <p:ext uri="{BB962C8B-B14F-4D97-AF65-F5344CB8AC3E}">
         <p14:creationId xmlns:p14="http://schemas.microsoft.com/office/powerpoint/2010/main" val="2133197452"/>
+      </p:ext>
+    </p:extLst>
+  </p:cSld>
+  <p:clrMapOvr>
+    <a:masterClrMapping/>
+  </p:clrMapOvr>
+</p:sld>
+</file>
+
+<file path=ppt/slides/slide9.xml><?xml version="1.0" encoding="utf-8"?>
+<p:sld xmlns:a="http://schemas.openxmlformats.org/drawingml/2006/main" xmlns:r="http://schemas.openxmlformats.org/officeDocument/2006/relationships" xmlns:p="http://schemas.openxmlformats.org/presentationml/2006/main">
+  <p:cSld>
+    <p:spTree>
+      <p:nvGrpSpPr>
+        <p:cNvPr id="1" name=""/>
+        <p:cNvGrpSpPr/>
+        <p:nvPr/>
+      </p:nvGrpSpPr>
+      <p:grpSpPr>
+        <a:xfrm>
+          <a:off x="0" y="0"/>
+          <a:ext cx="0" cy="0"/>
+          <a:chOff x="0" y="0"/>
+          <a:chExt cx="0" cy="0"/>
+        </a:xfrm>
+      </p:grpSpPr>
+      <p:sp>
+        <p:nvSpPr>
+          <p:cNvPr id="2" name="Title 1">
+            <a:extLst>
+              <a:ext uri="{FF2B5EF4-FFF2-40B4-BE49-F238E27FC236}">
+                <a16:creationId xmlns:a16="http://schemas.microsoft.com/office/drawing/2014/main" id="{232B095C-10CE-4597-A93B-9A6851EFE83E}"/>
+              </a:ext>
+            </a:extLst>
+          </p:cNvPr>
+          <p:cNvSpPr>
+            <a:spLocks noGrp="1"/>
+          </p:cNvSpPr>
+          <p:nvPr>
+            <p:ph type="title"/>
+          </p:nvPr>
+        </p:nvSpPr>
+        <p:spPr/>
+        <p:txBody>
+          <a:bodyPr/>
+          <a:lstStyle/>
+          <a:p>
+            <a:r>
+              <a:rPr lang="en-US" dirty="0"/>
+              <a:t>Test Case Document</a:t>
+            </a:r>
+          </a:p>
+        </p:txBody>
+      </p:sp>
+      <p:sp>
+        <p:nvSpPr>
+          <p:cNvPr id="3" name="Content Placeholder 2">
+            <a:extLst>
+              <a:ext uri="{FF2B5EF4-FFF2-40B4-BE49-F238E27FC236}">
+                <a16:creationId xmlns:a16="http://schemas.microsoft.com/office/drawing/2014/main" id="{9311785E-1C79-433F-8415-5101E8B435D2}"/>
+              </a:ext>
+            </a:extLst>
+          </p:cNvPr>
+          <p:cNvSpPr>
+            <a:spLocks noGrp="1"/>
+          </p:cNvSpPr>
+          <p:nvPr>
+            <p:ph idx="1"/>
+          </p:nvPr>
+        </p:nvSpPr>
+        <p:spPr/>
+        <p:txBody>
+          <a:bodyPr/>
+          <a:lstStyle/>
+          <a:p>
+            <a:r>
+              <a:rPr lang="en-US" dirty="0"/>
+              <a:t>Outlines all of the specific test cases for all user stories</a:t>
+            </a:r>
+          </a:p>
+          <a:p>
+            <a:r>
+              <a:rPr lang="en-US" dirty="0"/>
+              <a:t>Useful for the RTM</a:t>
+            </a:r>
+          </a:p>
+          <a:p>
+            <a:r>
+              <a:rPr lang="en-US" dirty="0"/>
+              <a:t>You don’t have to go into code base to have knowledge of what tests are exiting and if they pass or not, etc.</a:t>
+            </a:r>
+          </a:p>
+          <a:p>
+            <a:r>
+              <a:rPr lang="en-US" dirty="0"/>
+              <a:t>https://www.guru99.com/download-sample-test-case-template-with-explanation-of-important-fields.html</a:t>
+            </a:r>
+          </a:p>
+        </p:txBody>
+      </p:sp>
+    </p:spTree>
+    <p:extLst>
+      <p:ext uri="{BB962C8B-B14F-4D97-AF65-F5344CB8AC3E}">
+        <p14:creationId xmlns:p14="http://schemas.microsoft.com/office/powerpoint/2010/main" val="703996887"/>
       </p:ext>
     </p:extLst>
   </p:cSld>

</xml_diff>